<commit_message>
Added/modified program headers, added Menu button to game over/clear state
</commit_message>
<xml_diff>
--- a/Docs/Presentation Slides.pptx
+++ b/Docs/Presentation Slides.pptx
@@ -12,7 +12,8 @@
     <p:sldId id="259" r:id="rId6"/>
     <p:sldId id="262" r:id="rId7"/>
     <p:sldId id="261" r:id="rId8"/>
-    <p:sldId id="263" r:id="rId9"/>
+    <p:sldId id="265" r:id="rId9"/>
+    <p:sldId id="263" r:id="rId10"/>
   </p:sldIdLst>
   <p:sldSz cx="12192000" cy="6858000"/>
   <p:notesSz cx="6858000" cy="9144000"/>
@@ -450,7 +451,7 @@
           <a:p>
             <a:fld id="{24003394-7001-45AA-A250-6B735A9C4217}" type="datetimeFigureOut">
               <a:rPr lang="en-CA" smtClean="0"/>
-              <a:t>2016-12-12</a:t>
+              <a:t>2016-12-13</a:t>
             </a:fld>
             <a:endParaRPr lang="en-CA"/>
           </a:p>
@@ -774,7 +775,7 @@
           <a:p>
             <a:fld id="{24003394-7001-45AA-A250-6B735A9C4217}" type="datetimeFigureOut">
               <a:rPr lang="en-CA" smtClean="0"/>
-              <a:t>2016-12-12</a:t>
+              <a:t>2016-12-13</a:t>
             </a:fld>
             <a:endParaRPr lang="en-CA"/>
           </a:p>
@@ -1022,7 +1023,7 @@
           <a:p>
             <a:fld id="{24003394-7001-45AA-A250-6B735A9C4217}" type="datetimeFigureOut">
               <a:rPr lang="en-CA" smtClean="0"/>
-              <a:t>2016-12-12</a:t>
+              <a:t>2016-12-13</a:t>
             </a:fld>
             <a:endParaRPr lang="en-CA"/>
           </a:p>
@@ -1361,7 +1362,7 @@
           <a:p>
             <a:fld id="{24003394-7001-45AA-A250-6B735A9C4217}" type="datetimeFigureOut">
               <a:rPr lang="en-CA" smtClean="0"/>
-              <a:t>2016-12-12</a:t>
+              <a:t>2016-12-13</a:t>
             </a:fld>
             <a:endParaRPr lang="en-CA"/>
           </a:p>
@@ -1708,7 +1709,7 @@
           <a:p>
             <a:fld id="{24003394-7001-45AA-A250-6B735A9C4217}" type="datetimeFigureOut">
               <a:rPr lang="en-CA" smtClean="0"/>
-              <a:t>2016-12-12</a:t>
+              <a:t>2016-12-13</a:t>
             </a:fld>
             <a:endParaRPr lang="en-CA"/>
           </a:p>
@@ -2082,7 +2083,7 @@
           <a:p>
             <a:fld id="{24003394-7001-45AA-A250-6B735A9C4217}" type="datetimeFigureOut">
               <a:rPr lang="en-CA" smtClean="0"/>
-              <a:t>2016-12-12</a:t>
+              <a:t>2016-12-13</a:t>
             </a:fld>
             <a:endParaRPr lang="en-CA"/>
           </a:p>
@@ -2552,7 +2553,7 @@
           <a:p>
             <a:fld id="{24003394-7001-45AA-A250-6B735A9C4217}" type="datetimeFigureOut">
               <a:rPr lang="en-CA" smtClean="0"/>
-              <a:t>2016-12-12</a:t>
+              <a:t>2016-12-13</a:t>
             </a:fld>
             <a:endParaRPr lang="en-CA"/>
           </a:p>
@@ -2757,7 +2758,7 @@
           <a:p>
             <a:fld id="{24003394-7001-45AA-A250-6B735A9C4217}" type="datetimeFigureOut">
               <a:rPr lang="en-CA" smtClean="0"/>
-              <a:t>2016-12-12</a:t>
+              <a:t>2016-12-13</a:t>
             </a:fld>
             <a:endParaRPr lang="en-CA"/>
           </a:p>
@@ -2968,7 +2969,7 @@
           <a:p>
             <a:fld id="{24003394-7001-45AA-A250-6B735A9C4217}" type="datetimeFigureOut">
               <a:rPr lang="en-CA" smtClean="0"/>
-              <a:t>2016-12-12</a:t>
+              <a:t>2016-12-13</a:t>
             </a:fld>
             <a:endParaRPr lang="en-CA"/>
           </a:p>
@@ -3200,7 +3201,7 @@
           <a:p>
             <a:fld id="{24003394-7001-45AA-A250-6B735A9C4217}" type="datetimeFigureOut">
               <a:rPr lang="en-CA" smtClean="0"/>
-              <a:t>2016-12-12</a:t>
+              <a:t>2016-12-13</a:t>
             </a:fld>
             <a:endParaRPr lang="en-CA"/>
           </a:p>
@@ -3448,7 +3449,7 @@
           <a:p>
             <a:fld id="{24003394-7001-45AA-A250-6B735A9C4217}" type="datetimeFigureOut">
               <a:rPr lang="en-CA" smtClean="0"/>
-              <a:t>2016-12-12</a:t>
+              <a:t>2016-12-13</a:t>
             </a:fld>
             <a:endParaRPr lang="en-CA"/>
           </a:p>
@@ -3746,7 +3747,7 @@
           <a:p>
             <a:fld id="{24003394-7001-45AA-A250-6B735A9C4217}" type="datetimeFigureOut">
               <a:rPr lang="en-CA" smtClean="0"/>
-              <a:t>2016-12-12</a:t>
+              <a:t>2016-12-13</a:t>
             </a:fld>
             <a:endParaRPr lang="en-CA"/>
           </a:p>
@@ -4140,7 +4141,7 @@
           <a:p>
             <a:fld id="{24003394-7001-45AA-A250-6B735A9C4217}" type="datetimeFigureOut">
               <a:rPr lang="en-CA" smtClean="0"/>
-              <a:t>2016-12-12</a:t>
+              <a:t>2016-12-13</a:t>
             </a:fld>
             <a:endParaRPr lang="en-CA"/>
           </a:p>
@@ -4289,7 +4290,7 @@
           <a:p>
             <a:fld id="{24003394-7001-45AA-A250-6B735A9C4217}" type="datetimeFigureOut">
               <a:rPr lang="en-CA" smtClean="0"/>
-              <a:t>2016-12-12</a:t>
+              <a:t>2016-12-13</a:t>
             </a:fld>
             <a:endParaRPr lang="en-CA"/>
           </a:p>
@@ -4415,7 +4416,7 @@
           <a:p>
             <a:fld id="{24003394-7001-45AA-A250-6B735A9C4217}" type="datetimeFigureOut">
               <a:rPr lang="en-CA" smtClean="0"/>
-              <a:t>2016-12-12</a:t>
+              <a:t>2016-12-13</a:t>
             </a:fld>
             <a:endParaRPr lang="en-CA"/>
           </a:p>
@@ -4670,7 +4671,7 @@
           <a:p>
             <a:fld id="{24003394-7001-45AA-A250-6B735A9C4217}" type="datetimeFigureOut">
               <a:rPr lang="en-CA" smtClean="0"/>
-              <a:t>2016-12-12</a:t>
+              <a:t>2016-12-13</a:t>
             </a:fld>
             <a:endParaRPr lang="en-CA"/>
           </a:p>
@@ -4985,7 +4986,7 @@
           <a:p>
             <a:fld id="{24003394-7001-45AA-A250-6B735A9C4217}" type="datetimeFigureOut">
               <a:rPr lang="en-CA" smtClean="0"/>
-              <a:t>2016-12-12</a:t>
+              <a:t>2016-12-13</a:t>
             </a:fld>
             <a:endParaRPr lang="en-CA"/>
           </a:p>
@@ -5336,7 +5337,7 @@
           <a:p>
             <a:fld id="{24003394-7001-45AA-A250-6B735A9C4217}" type="datetimeFigureOut">
               <a:rPr lang="en-CA" smtClean="0"/>
-              <a:t>2016-12-12</a:t>
+              <a:t>2016-12-13</a:t>
             </a:fld>
             <a:endParaRPr lang="en-CA"/>
           </a:p>
@@ -6070,11 +6071,11 @@
   <p:clrMapOvr>
     <a:masterClrMapping/>
   </p:clrMapOvr>
-  <mc:AlternateContent xmlns:mc="http://schemas.openxmlformats.org/markup-compatibility/2006">
-    <mc:Choice xmlns:p14="http://schemas.microsoft.com/office/powerpoint/2010/main" Requires="p14">
+  <mc:AlternateContent xmlns:mc="http://schemas.openxmlformats.org/markup-compatibility/2006" xmlns:p14="http://schemas.microsoft.com/office/powerpoint/2010/main">
+    <mc:Choice Requires="p14">
       <p:transition p14:dur="0"/>
     </mc:Choice>
-    <mc:Fallback>
+    <mc:Fallback xmlns="">
       <p:transition/>
     </mc:Fallback>
   </mc:AlternateContent>
@@ -6230,13 +6231,13 @@
   <p:clrMapOvr>
     <a:masterClrMapping/>
   </p:clrMapOvr>
-  <mc:AlternateContent xmlns:mc="http://schemas.openxmlformats.org/markup-compatibility/2006">
-    <mc:Choice xmlns:p15="http://schemas.microsoft.com/office/powerpoint/2012/main" Requires="p15">
+  <mc:AlternateContent xmlns:mc="http://schemas.openxmlformats.org/markup-compatibility/2006" xmlns:p15="http://schemas.microsoft.com/office/powerpoint/2012/main">
+    <mc:Choice Requires="p15">
       <p:transition spd="med">
         <p15:prstTrans prst="peelOff"/>
       </p:transition>
     </mc:Choice>
-    <mc:Fallback>
+    <mc:Fallback xmlns="">
       <p:transition spd="med">
         <p:fade/>
       </p:transition>
@@ -6453,13 +6454,13 @@
   <p:clrMapOvr>
     <a:masterClrMapping/>
   </p:clrMapOvr>
-  <mc:AlternateContent xmlns:mc="http://schemas.openxmlformats.org/markup-compatibility/2006">
-    <mc:Choice xmlns:p15="http://schemas.microsoft.com/office/powerpoint/2012/main" Requires="p15">
+  <mc:AlternateContent xmlns:mc="http://schemas.openxmlformats.org/markup-compatibility/2006" xmlns:p15="http://schemas.microsoft.com/office/powerpoint/2012/main">
+    <mc:Choice Requires="p15">
       <p:transition spd="med">
         <p15:prstTrans prst="peelOff"/>
       </p:transition>
     </mc:Choice>
-    <mc:Fallback>
+    <mc:Fallback xmlns="">
       <p:transition spd="med">
         <p:fade/>
       </p:transition>
@@ -6589,13 +6590,13 @@
   <p:clrMapOvr>
     <a:masterClrMapping/>
   </p:clrMapOvr>
-  <mc:AlternateContent xmlns:mc="http://schemas.openxmlformats.org/markup-compatibility/2006">
-    <mc:Choice xmlns:p15="http://schemas.microsoft.com/office/powerpoint/2012/main" Requires="p15">
+  <mc:AlternateContent xmlns:mc="http://schemas.openxmlformats.org/markup-compatibility/2006" xmlns:p15="http://schemas.microsoft.com/office/powerpoint/2012/main">
+    <mc:Choice Requires="p15">
       <p:transition spd="med">
         <p15:prstTrans prst="peelOff"/>
       </p:transition>
     </mc:Choice>
-    <mc:Fallback>
+    <mc:Fallback xmlns="">
       <p:transition spd="med">
         <p:fade/>
       </p:transition>
@@ -7153,12 +7154,6 @@
               </a:rPr>
               <a:t> +5 for completing a level </a:t>
             </a:r>
-            <a:endParaRPr lang="en-CA" dirty="0">
-              <a:solidFill>
-                <a:srgbClr val="008000"/>
-              </a:solidFill>
-              <a:latin typeface="KG The Last Time" panose="02000505000000020004" pitchFamily="2" charset="0"/>
-            </a:endParaRPr>
           </a:p>
         </p:txBody>
       </p:sp>
@@ -7172,13 +7167,13 @@
   <p:clrMapOvr>
     <a:masterClrMapping/>
   </p:clrMapOvr>
-  <mc:AlternateContent xmlns:mc="http://schemas.openxmlformats.org/markup-compatibility/2006">
-    <mc:Choice xmlns:p15="http://schemas.microsoft.com/office/powerpoint/2012/main" Requires="p15">
+  <mc:AlternateContent xmlns:mc="http://schemas.openxmlformats.org/markup-compatibility/2006" xmlns:p15="http://schemas.microsoft.com/office/powerpoint/2012/main">
+    <mc:Choice Requires="p15">
       <p:transition spd="med">
         <p15:prstTrans prst="peelOff"/>
       </p:transition>
     </mc:Choice>
-    <mc:Fallback>
+    <mc:Fallback xmlns="">
       <p:transition spd="med">
         <p:fade/>
       </p:transition>
@@ -7303,13 +7298,13 @@
   <p:clrMapOvr>
     <a:masterClrMapping/>
   </p:clrMapOvr>
-  <mc:AlternateContent xmlns:mc="http://schemas.openxmlformats.org/markup-compatibility/2006">
-    <mc:Choice xmlns:p15="http://schemas.microsoft.com/office/powerpoint/2012/main" Requires="p15">
+  <mc:AlternateContent xmlns:mc="http://schemas.openxmlformats.org/markup-compatibility/2006" xmlns:p15="http://schemas.microsoft.com/office/powerpoint/2012/main">
+    <mc:Choice Requires="p15">
       <p:transition xmlns:p14="http://schemas.microsoft.com/office/powerpoint/2010/main" spd="slow" p14:dur="1250">
         <p15:prstTrans prst="airplane"/>
       </p:transition>
     </mc:Choice>
-    <mc:Fallback>
+    <mc:Fallback xmlns="">
       <p:transition spd="slow">
         <p:fade/>
       </p:transition>
@@ -7432,13 +7427,13 @@
   <p:clrMapOvr>
     <a:masterClrMapping/>
   </p:clrMapOvr>
-  <mc:AlternateContent xmlns:mc="http://schemas.openxmlformats.org/markup-compatibility/2006">
-    <mc:Choice xmlns:p15="http://schemas.microsoft.com/office/powerpoint/2012/main" Requires="p15">
+  <mc:AlternateContent xmlns:mc="http://schemas.openxmlformats.org/markup-compatibility/2006" xmlns:p15="http://schemas.microsoft.com/office/powerpoint/2012/main">
+    <mc:Choice Requires="p15">
       <p:transition spd="med">
         <p15:prstTrans prst="peelOff"/>
       </p:transition>
     </mc:Choice>
-    <mc:Fallback>
+    <mc:Fallback xmlns="">
       <p:transition spd="med">
         <p:fade/>
       </p:transition>
@@ -7492,6 +7487,144 @@
             <a:spLocks noGrp="1"/>
           </p:cNvSpPr>
           <p:nvPr>
+            <p:ph type="title"/>
+          </p:nvPr>
+        </p:nvSpPr>
+        <p:spPr/>
+        <p:txBody>
+          <a:bodyPr>
+            <a:normAutofit/>
+          </a:bodyPr>
+          <a:lstStyle/>
+          <a:p>
+            <a:r>
+              <a:rPr lang="en-CA" sz="5400" dirty="0" smtClean="0">
+                <a:solidFill>
+                  <a:srgbClr val="008000"/>
+                </a:solidFill>
+                <a:latin typeface="KG The Last Time" panose="02000505000000020004" pitchFamily="2" charset="0"/>
+              </a:rPr>
+              <a:t>Future Possibilities</a:t>
+            </a:r>
+            <a:endParaRPr lang="en-CA" sz="5400" dirty="0">
+              <a:solidFill>
+                <a:srgbClr val="008000"/>
+              </a:solidFill>
+              <a:latin typeface="KG The Last Time" panose="02000505000000020004" pitchFamily="2" charset="0"/>
+            </a:endParaRPr>
+          </a:p>
+        </p:txBody>
+      </p:sp>
+      <p:sp>
+        <p:nvSpPr>
+          <p:cNvPr id="3" name="Content Placeholder 2"/>
+          <p:cNvSpPr>
+            <a:spLocks noGrp="1"/>
+          </p:cNvSpPr>
+          <p:nvPr>
+            <p:ph idx="1"/>
+          </p:nvPr>
+        </p:nvSpPr>
+        <p:spPr/>
+        <p:txBody>
+          <a:bodyPr>
+            <a:normAutofit/>
+          </a:bodyPr>
+          <a:lstStyle/>
+          <a:p>
+            <a:pPr>
+              <a:buBlip>
+                <a:blip r:embed="rId3"/>
+              </a:buBlip>
+            </a:pPr>
+            <a:r>
+              <a:rPr lang="en-CA" sz="2800" dirty="0" smtClean="0">
+                <a:solidFill>
+                  <a:srgbClr val="008000"/>
+                </a:solidFill>
+                <a:latin typeface="KG The Last Time" panose="02000505000000020004" pitchFamily="2" charset="0"/>
+              </a:rPr>
+              <a:t> NPCs that need to be rescued</a:t>
+            </a:r>
+            <a:endParaRPr lang="en-CA" sz="2800" dirty="0">
+              <a:solidFill>
+                <a:srgbClr val="008000"/>
+              </a:solidFill>
+              <a:latin typeface="KG The Last Time" panose="02000505000000020004" pitchFamily="2" charset="0"/>
+            </a:endParaRPr>
+          </a:p>
+        </p:txBody>
+      </p:sp>
+    </p:spTree>
+    <p:extLst>
+      <p:ext uri="{BB962C8B-B14F-4D97-AF65-F5344CB8AC3E}">
+        <p14:creationId xmlns:p14="http://schemas.microsoft.com/office/powerpoint/2010/main" val="4187541915"/>
+      </p:ext>
+    </p:extLst>
+  </p:cSld>
+  <p:clrMapOvr>
+    <a:masterClrMapping/>
+  </p:clrMapOvr>
+  <mc:AlternateContent xmlns:mc="http://schemas.openxmlformats.org/markup-compatibility/2006" xmlns:p15="http://schemas.microsoft.com/office/powerpoint/2012/main">
+    <mc:Choice Requires="p15">
+      <p:transition spd="med">
+        <p15:prstTrans prst="peelOff"/>
+      </p:transition>
+    </mc:Choice>
+    <mc:Fallback xmlns="">
+      <p:transition spd="med">
+        <p:fade/>
+      </p:transition>
+    </mc:Fallback>
+  </mc:AlternateContent>
+  <p:timing>
+    <p:tnLst>
+      <p:par>
+        <p:cTn id="1" dur="indefinite" restart="never" nodeType="tmRoot"/>
+      </p:par>
+    </p:tnLst>
+  </p:timing>
+</p:sld>
+</file>
+
+<file path=ppt/slides/slide9.xml><?xml version="1.0" encoding="utf-8"?>
+<p:sld xmlns:a="http://schemas.openxmlformats.org/drawingml/2006/main" xmlns:r="http://schemas.openxmlformats.org/officeDocument/2006/relationships" xmlns:p="http://schemas.openxmlformats.org/presentationml/2006/main">
+  <p:cSld>
+    <p:bg>
+      <p:bgPr>
+        <a:blipFill dpi="0" rotWithShape="1">
+          <a:blip r:embed="rId2">
+            <a:lum/>
+          </a:blip>
+          <a:srcRect/>
+          <a:stretch>
+            <a:fillRect l="-32000" r="-32000"/>
+          </a:stretch>
+        </a:blipFill>
+        <a:effectLst/>
+      </p:bgPr>
+    </p:bg>
+    <p:spTree>
+      <p:nvGrpSpPr>
+        <p:cNvPr id="1" name=""/>
+        <p:cNvGrpSpPr/>
+        <p:nvPr/>
+      </p:nvGrpSpPr>
+      <p:grpSpPr>
+        <a:xfrm>
+          <a:off x="0" y="0"/>
+          <a:ext cx="0" cy="0"/>
+          <a:chOff x="0" y="0"/>
+          <a:chExt cx="0" cy="0"/>
+        </a:xfrm>
+      </p:grpSpPr>
+      <p:sp>
+        <p:nvSpPr>
+          <p:cNvPr id="2" name="Title 1"/>
+          <p:cNvSpPr>
+            <a:spLocks noGrp="1"/>
+          </p:cNvSpPr>
+          <p:nvPr>
             <p:ph type="ctrTitle"/>
           </p:nvPr>
         </p:nvSpPr>
@@ -7563,13 +7696,13 @@
   <p:clrMapOvr>
     <a:masterClrMapping/>
   </p:clrMapOvr>
-  <mc:AlternateContent xmlns:mc="http://schemas.openxmlformats.org/markup-compatibility/2006">
-    <mc:Choice xmlns:p15="http://schemas.microsoft.com/office/powerpoint/2012/main" Requires="p15">
+  <mc:AlternateContent xmlns:mc="http://schemas.openxmlformats.org/markup-compatibility/2006" xmlns:p15="http://schemas.microsoft.com/office/powerpoint/2012/main">
+    <mc:Choice Requires="p15">
       <p:transition spd="med">
         <p15:prstTrans prst="peelOff"/>
       </p:transition>
     </mc:Choice>
-    <mc:Fallback>
+    <mc:Fallback xmlns="">
       <p:transition spd="med">
         <p:fade/>
       </p:transition>

</xml_diff>

<commit_message>
Added a Future Possibilities slide to the slide deck
</commit_message>
<xml_diff>
--- a/Docs/Presentation Slides.pptx
+++ b/Docs/Presentation Slides.pptx
@@ -1,6 +1,6 @@
 
 <file path=ppt/presentation.xml><?xml version="1.0" encoding="utf-8"?>
-<p:presentation xmlns:a="http://schemas.openxmlformats.org/drawingml/2006/main" xmlns:r="http://schemas.openxmlformats.org/officeDocument/2006/relationships" xmlns:p="http://schemas.openxmlformats.org/presentationml/2006/main" saveSubsetFonts="1">
+<p:presentation xmlns:a="http://schemas.openxmlformats.org/drawingml/2006/main" xmlns:r="http://schemas.openxmlformats.org/officeDocument/2006/relationships" xmlns:p="http://schemas.openxmlformats.org/presentationml/2006/main" embedTrueTypeFonts="1">
   <p:sldMasterIdLst>
     <p:sldMasterId id="2147483660" r:id="rId1"/>
   </p:sldMasterIdLst>
@@ -17,6 +17,18 @@
   </p:sldIdLst>
   <p:sldSz cx="12192000" cy="6858000"/>
   <p:notesSz cx="6858000" cy="9144000"/>
+  <p:embeddedFontLst>
+    <p:embeddedFont>
+      <p:font typeface="Garamond" panose="02020404030301010803" pitchFamily="18" charset="0"/>
+      <p:regular r:id="rId11"/>
+      <p:bold r:id="rId12"/>
+      <p:italic r:id="rId13"/>
+    </p:embeddedFont>
+    <p:embeddedFont>
+      <p:font typeface="KG The Last Time" panose="02000505000000020004" pitchFamily="2" charset="0"/>
+      <p:regular r:id="rId14"/>
+    </p:embeddedFont>
+  </p:embeddedFontLst>
   <p:defaultTextStyle>
     <a:defPPr>
       <a:defRPr lang="en-US"/>
@@ -451,7 +463,7 @@
           <a:p>
             <a:fld id="{24003394-7001-45AA-A250-6B735A9C4217}" type="datetimeFigureOut">
               <a:rPr lang="en-CA" smtClean="0"/>
-              <a:t>2016-12-13</a:t>
+              <a:t>2016-12-15</a:t>
             </a:fld>
             <a:endParaRPr lang="en-CA"/>
           </a:p>
@@ -775,7 +787,7 @@
           <a:p>
             <a:fld id="{24003394-7001-45AA-A250-6B735A9C4217}" type="datetimeFigureOut">
               <a:rPr lang="en-CA" smtClean="0"/>
-              <a:t>2016-12-13</a:t>
+              <a:t>2016-12-15</a:t>
             </a:fld>
             <a:endParaRPr lang="en-CA"/>
           </a:p>
@@ -1023,7 +1035,7 @@
           <a:p>
             <a:fld id="{24003394-7001-45AA-A250-6B735A9C4217}" type="datetimeFigureOut">
               <a:rPr lang="en-CA" smtClean="0"/>
-              <a:t>2016-12-13</a:t>
+              <a:t>2016-12-15</a:t>
             </a:fld>
             <a:endParaRPr lang="en-CA"/>
           </a:p>
@@ -1362,7 +1374,7 @@
           <a:p>
             <a:fld id="{24003394-7001-45AA-A250-6B735A9C4217}" type="datetimeFigureOut">
               <a:rPr lang="en-CA" smtClean="0"/>
-              <a:t>2016-12-13</a:t>
+              <a:t>2016-12-15</a:t>
             </a:fld>
             <a:endParaRPr lang="en-CA"/>
           </a:p>
@@ -1709,7 +1721,7 @@
           <a:p>
             <a:fld id="{24003394-7001-45AA-A250-6B735A9C4217}" type="datetimeFigureOut">
               <a:rPr lang="en-CA" smtClean="0"/>
-              <a:t>2016-12-13</a:t>
+              <a:t>2016-12-15</a:t>
             </a:fld>
             <a:endParaRPr lang="en-CA"/>
           </a:p>
@@ -2083,7 +2095,7 @@
           <a:p>
             <a:fld id="{24003394-7001-45AA-A250-6B735A9C4217}" type="datetimeFigureOut">
               <a:rPr lang="en-CA" smtClean="0"/>
-              <a:t>2016-12-13</a:t>
+              <a:t>2016-12-15</a:t>
             </a:fld>
             <a:endParaRPr lang="en-CA"/>
           </a:p>
@@ -2553,7 +2565,7 @@
           <a:p>
             <a:fld id="{24003394-7001-45AA-A250-6B735A9C4217}" type="datetimeFigureOut">
               <a:rPr lang="en-CA" smtClean="0"/>
-              <a:t>2016-12-13</a:t>
+              <a:t>2016-12-15</a:t>
             </a:fld>
             <a:endParaRPr lang="en-CA"/>
           </a:p>
@@ -2758,7 +2770,7 @@
           <a:p>
             <a:fld id="{24003394-7001-45AA-A250-6B735A9C4217}" type="datetimeFigureOut">
               <a:rPr lang="en-CA" smtClean="0"/>
-              <a:t>2016-12-13</a:t>
+              <a:t>2016-12-15</a:t>
             </a:fld>
             <a:endParaRPr lang="en-CA"/>
           </a:p>
@@ -2969,7 +2981,7 @@
           <a:p>
             <a:fld id="{24003394-7001-45AA-A250-6B735A9C4217}" type="datetimeFigureOut">
               <a:rPr lang="en-CA" smtClean="0"/>
-              <a:t>2016-12-13</a:t>
+              <a:t>2016-12-15</a:t>
             </a:fld>
             <a:endParaRPr lang="en-CA"/>
           </a:p>
@@ -3201,7 +3213,7 @@
           <a:p>
             <a:fld id="{24003394-7001-45AA-A250-6B735A9C4217}" type="datetimeFigureOut">
               <a:rPr lang="en-CA" smtClean="0"/>
-              <a:t>2016-12-13</a:t>
+              <a:t>2016-12-15</a:t>
             </a:fld>
             <a:endParaRPr lang="en-CA"/>
           </a:p>
@@ -3449,7 +3461,7 @@
           <a:p>
             <a:fld id="{24003394-7001-45AA-A250-6B735A9C4217}" type="datetimeFigureOut">
               <a:rPr lang="en-CA" smtClean="0"/>
-              <a:t>2016-12-13</a:t>
+              <a:t>2016-12-15</a:t>
             </a:fld>
             <a:endParaRPr lang="en-CA"/>
           </a:p>
@@ -3747,7 +3759,7 @@
           <a:p>
             <a:fld id="{24003394-7001-45AA-A250-6B735A9C4217}" type="datetimeFigureOut">
               <a:rPr lang="en-CA" smtClean="0"/>
-              <a:t>2016-12-13</a:t>
+              <a:t>2016-12-15</a:t>
             </a:fld>
             <a:endParaRPr lang="en-CA"/>
           </a:p>
@@ -4141,7 +4153,7 @@
           <a:p>
             <a:fld id="{24003394-7001-45AA-A250-6B735A9C4217}" type="datetimeFigureOut">
               <a:rPr lang="en-CA" smtClean="0"/>
-              <a:t>2016-12-13</a:t>
+              <a:t>2016-12-15</a:t>
             </a:fld>
             <a:endParaRPr lang="en-CA"/>
           </a:p>
@@ -4290,7 +4302,7 @@
           <a:p>
             <a:fld id="{24003394-7001-45AA-A250-6B735A9C4217}" type="datetimeFigureOut">
               <a:rPr lang="en-CA" smtClean="0"/>
-              <a:t>2016-12-13</a:t>
+              <a:t>2016-12-15</a:t>
             </a:fld>
             <a:endParaRPr lang="en-CA"/>
           </a:p>
@@ -4416,7 +4428,7 @@
           <a:p>
             <a:fld id="{24003394-7001-45AA-A250-6B735A9C4217}" type="datetimeFigureOut">
               <a:rPr lang="en-CA" smtClean="0"/>
-              <a:t>2016-12-13</a:t>
+              <a:t>2016-12-15</a:t>
             </a:fld>
             <a:endParaRPr lang="en-CA"/>
           </a:p>
@@ -4671,7 +4683,7 @@
           <a:p>
             <a:fld id="{24003394-7001-45AA-A250-6B735A9C4217}" type="datetimeFigureOut">
               <a:rPr lang="en-CA" smtClean="0"/>
-              <a:t>2016-12-13</a:t>
+              <a:t>2016-12-15</a:t>
             </a:fld>
             <a:endParaRPr lang="en-CA"/>
           </a:p>
@@ -4986,7 +4998,7 @@
           <a:p>
             <a:fld id="{24003394-7001-45AA-A250-6B735A9C4217}" type="datetimeFigureOut">
               <a:rPr lang="en-CA" smtClean="0"/>
-              <a:t>2016-12-13</a:t>
+              <a:t>2016-12-15</a:t>
             </a:fld>
             <a:endParaRPr lang="en-CA"/>
           </a:p>
@@ -5337,7 +5349,7 @@
           <a:p>
             <a:fld id="{24003394-7001-45AA-A250-6B735A9C4217}" type="datetimeFigureOut">
               <a:rPr lang="en-CA" smtClean="0"/>
-              <a:t>2016-12-13</a:t>
+              <a:t>2016-12-15</a:t>
             </a:fld>
             <a:endParaRPr lang="en-CA"/>
           </a:p>
@@ -6200,7 +6212,25 @@
                 </a:solidFill>
                 <a:latin typeface="KG The Last Time" panose="02000505000000020004" pitchFamily="2" charset="0"/>
               </a:rPr>
-              <a:t> Beat the clock</a:t>
+              <a:t> </a:t>
+            </a:r>
+            <a:r>
+              <a:rPr lang="en-CA" sz="4000" dirty="0" smtClean="0">
+                <a:solidFill>
+                  <a:srgbClr val="008000"/>
+                </a:solidFill>
+                <a:latin typeface="KG The Last Time" panose="02000505000000020004" pitchFamily="2" charset="0"/>
+              </a:rPr>
+              <a:t>Beat </a:t>
+            </a:r>
+            <a:r>
+              <a:rPr lang="en-CA" sz="4000" dirty="0" smtClean="0">
+                <a:solidFill>
+                  <a:srgbClr val="008000"/>
+                </a:solidFill>
+                <a:latin typeface="KG The Last Time" panose="02000505000000020004" pitchFamily="2" charset="0"/>
+              </a:rPr>
+              <a:t>the clock</a:t>
             </a:r>
           </a:p>
           <a:p>
@@ -6216,8 +6246,48 @@
                 </a:solidFill>
                 <a:latin typeface="KG The Last Time" panose="02000505000000020004" pitchFamily="2" charset="0"/>
               </a:rPr>
-              <a:t> Avoid enemies</a:t>
-            </a:r>
+              <a:t> </a:t>
+            </a:r>
+            <a:r>
+              <a:rPr lang="en-CA" sz="4000" dirty="0" smtClean="0">
+                <a:solidFill>
+                  <a:srgbClr val="008000"/>
+                </a:solidFill>
+                <a:latin typeface="KG The Last Time" panose="02000505000000020004" pitchFamily="2" charset="0"/>
+              </a:rPr>
+              <a:t>Avoid enemies</a:t>
+            </a:r>
+          </a:p>
+          <a:p>
+            <a:pPr>
+              <a:buBlip>
+                <a:blip r:embed="rId3"/>
+              </a:buBlip>
+            </a:pPr>
+            <a:r>
+              <a:rPr lang="en-CA" sz="4000" dirty="0">
+                <a:solidFill>
+                  <a:srgbClr val="008000"/>
+                </a:solidFill>
+                <a:latin typeface="KG The Last Time" panose="02000505000000020004" pitchFamily="2" charset="0"/>
+              </a:rPr>
+              <a:t> </a:t>
+            </a:r>
+            <a:r>
+              <a:rPr lang="en-CA" sz="4000" dirty="0" smtClean="0">
+                <a:solidFill>
+                  <a:srgbClr val="008000"/>
+                </a:solidFill>
+                <a:latin typeface="KG The Last Time" panose="02000505000000020004" pitchFamily="2" charset="0"/>
+              </a:rPr>
+              <a:t>Collect points</a:t>
+            </a:r>
+            <a:endParaRPr lang="en-CA" sz="4000" dirty="0" smtClean="0">
+              <a:solidFill>
+                <a:srgbClr val="008000"/>
+              </a:solidFill>
+              <a:latin typeface="KG The Last Time" panose="02000505000000020004" pitchFamily="2" charset="0"/>
+            </a:endParaRPr>
           </a:p>
         </p:txBody>
       </p:sp>
@@ -7532,21 +7602,53 @@
           </a:bodyPr>
           <a:lstStyle/>
           <a:p>
-            <a:pPr>
+            <a:pPr marL="541338" indent="-541338">
               <a:buBlip>
                 <a:blip r:embed="rId3"/>
               </a:buBlip>
             </a:pPr>
             <a:r>
-              <a:rPr lang="en-CA" sz="2800" dirty="0" smtClean="0">
+              <a:rPr lang="en-CA" sz="4000" dirty="0" smtClean="0">
                 <a:solidFill>
                   <a:srgbClr val="008000"/>
                 </a:solidFill>
                 <a:latin typeface="KG The Last Time" panose="02000505000000020004" pitchFamily="2" charset="0"/>
               </a:rPr>
-              <a:t> NPCs that need to be rescued</a:t>
-            </a:r>
-            <a:endParaRPr lang="en-CA" sz="2800" dirty="0">
+              <a:t>Ability to shoot enemies</a:t>
+            </a:r>
+          </a:p>
+          <a:p>
+            <a:pPr marL="541338" indent="-541338">
+              <a:buBlip>
+                <a:blip r:embed="rId3"/>
+              </a:buBlip>
+            </a:pPr>
+            <a:r>
+              <a:rPr lang="en-CA" sz="4000" dirty="0" smtClean="0">
+                <a:solidFill>
+                  <a:srgbClr val="008000"/>
+                </a:solidFill>
+                <a:latin typeface="KG The Last Time" panose="02000505000000020004" pitchFamily="2" charset="0"/>
+              </a:rPr>
+              <a:t>NPCs that need to be escorted</a:t>
+            </a:r>
+          </a:p>
+          <a:p>
+            <a:pPr marL="541338" indent="-541338">
+              <a:buBlip>
+                <a:blip r:embed="rId3"/>
+              </a:buBlip>
+            </a:pPr>
+            <a:r>
+              <a:rPr lang="en-CA" sz="4000" dirty="0" smtClean="0">
+                <a:solidFill>
+                  <a:srgbClr val="008000"/>
+                </a:solidFill>
+                <a:latin typeface="KG The Last Time" panose="02000505000000020004" pitchFamily="2" charset="0"/>
+              </a:rPr>
+              <a:t>Final boss!</a:t>
+            </a:r>
+            <a:endParaRPr lang="en-CA" sz="4000" dirty="0">
               <a:solidFill>
                 <a:srgbClr val="008000"/>
               </a:solidFill>

</xml_diff>